<commit_message>
Update the slides of the bilibili-video-slides 08 to add the links of screenshot
</commit_message>
<xml_diff>
--- a/bilibili-video-slides/08-The Incubator of Ark Compiler.pptx
+++ b/bilibili-video-slides/08-The Incubator of Ark Compiler.pptx
@@ -202,7 +202,7 @@
           <a:p>
             <a:fld id="{04C80880-F302-464D-8BDD-89094BDEB1EE}" type="datetimeFigureOut">
               <a:rPr lang="zh-CN" altLang="en-US" smtClean="0"/>
-              <a:t>2020/1/10</a:t>
+              <a:t>2020/1/11</a:t>
             </a:fld>
             <a:endParaRPr lang="zh-CN" altLang="en-US"/>
           </a:p>
@@ -1568,7 +1568,7 @@
           <a:p>
             <a:fld id="{B6FA4BFB-5050-4CC5-ACEE-21A4EB9CD409}" type="datetimeFigureOut">
               <a:rPr lang="zh-CN" altLang="en-US" smtClean="0"/>
-              <a:t>2020/1/10</a:t>
+              <a:t>2020/1/11</a:t>
             </a:fld>
             <a:endParaRPr lang="zh-CN" altLang="en-US"/>
           </a:p>
@@ -7388,6 +7388,48 @@
           </a:prstGeom>
         </p:spPr>
       </p:pic>
+      <p:sp>
+        <p:nvSpPr>
+          <p:cNvPr id="4" name="文本框 3">
+            <a:extLst>
+              <a:ext uri="{FF2B5EF4-FFF2-40B4-BE49-F238E27FC236}">
+                <a16:creationId xmlns:a16="http://schemas.microsoft.com/office/drawing/2014/main" id="{ADB8B419-015D-40D6-9DFD-2388567AECE3}"/>
+              </a:ext>
+            </a:extLst>
+          </p:cNvPr>
+          <p:cNvSpPr txBox="1"/>
+          <p:nvPr/>
+        </p:nvSpPr>
+        <p:spPr>
+          <a:xfrm>
+            <a:off x="9073662" y="4135902"/>
+            <a:ext cx="2926080" cy="1200329"/>
+          </a:xfrm>
+          <a:prstGeom prst="rect">
+            <a:avLst/>
+          </a:prstGeom>
+          <a:noFill/>
+        </p:spPr>
+        <p:txBody>
+          <a:bodyPr wrap="square" rtlCol="0">
+            <a:spAutoFit/>
+          </a:bodyPr>
+          <a:lstStyle/>
+          <a:p>
+            <a:r>
+              <a:rPr lang="en-US" altLang="zh-CN" dirty="0"/>
+              <a:t>From:</a:t>
+            </a:r>
+          </a:p>
+          <a:p>
+            <a:r>
+              <a:rPr lang="en-US" altLang="zh-CN" dirty="0"/>
+              <a:t>https://gitee.com/organizations/openarkcompiler-incubator</a:t>
+            </a:r>
+            <a:endParaRPr lang="zh-CN" altLang="en-US" dirty="0"/>
+          </a:p>
+        </p:txBody>
+      </p:sp>
     </p:spTree>
     <p:extLst>
       <p:ext uri="{BB962C8B-B14F-4D97-AF65-F5344CB8AC3E}">
@@ -7517,6 +7559,48 @@
           </a:prstGeom>
         </p:spPr>
       </p:pic>
+      <p:sp>
+        <p:nvSpPr>
+          <p:cNvPr id="4" name="文本框 3">
+            <a:extLst>
+              <a:ext uri="{FF2B5EF4-FFF2-40B4-BE49-F238E27FC236}">
+                <a16:creationId xmlns:a16="http://schemas.microsoft.com/office/drawing/2014/main" id="{E3AEA719-DFD4-4606-B4C8-8AC4DB3E0493}"/>
+              </a:ext>
+            </a:extLst>
+          </p:cNvPr>
+          <p:cNvSpPr txBox="1"/>
+          <p:nvPr/>
+        </p:nvSpPr>
+        <p:spPr>
+          <a:xfrm>
+            <a:off x="9087729" y="4317580"/>
+            <a:ext cx="2850272" cy="1200329"/>
+          </a:xfrm>
+          <a:prstGeom prst="rect">
+            <a:avLst/>
+          </a:prstGeom>
+          <a:noFill/>
+        </p:spPr>
+        <p:txBody>
+          <a:bodyPr wrap="square" rtlCol="0">
+            <a:spAutoFit/>
+          </a:bodyPr>
+          <a:lstStyle/>
+          <a:p>
+            <a:r>
+              <a:rPr lang="en-US" altLang="zh-CN" dirty="0"/>
+              <a:t>From:</a:t>
+            </a:r>
+          </a:p>
+          <a:p>
+            <a:r>
+              <a:rPr lang="en-US" altLang="zh-CN" dirty="0"/>
+              <a:t>https://gitee.com/organizations/openarkcompiler-incubator/projects</a:t>
+            </a:r>
+            <a:endParaRPr lang="zh-CN" altLang="en-US" dirty="0"/>
+          </a:p>
+        </p:txBody>
+      </p:sp>
     </p:spTree>
     <p:extLst>
       <p:ext uri="{BB962C8B-B14F-4D97-AF65-F5344CB8AC3E}">
@@ -7644,6 +7728,48 @@
           </a:prstGeom>
         </p:spPr>
       </p:pic>
+      <p:sp>
+        <p:nvSpPr>
+          <p:cNvPr id="5" name="文本框 4">
+            <a:extLst>
+              <a:ext uri="{FF2B5EF4-FFF2-40B4-BE49-F238E27FC236}">
+                <a16:creationId xmlns:a16="http://schemas.microsoft.com/office/drawing/2014/main" id="{AF9B2B9F-7A4D-4C30-8A72-6F4A67E02D6A}"/>
+              </a:ext>
+            </a:extLst>
+          </p:cNvPr>
+          <p:cNvSpPr txBox="1"/>
+          <p:nvPr/>
+        </p:nvSpPr>
+        <p:spPr>
+          <a:xfrm>
+            <a:off x="8623495" y="4642338"/>
+            <a:ext cx="3314505" cy="923330"/>
+          </a:xfrm>
+          <a:prstGeom prst="rect">
+            <a:avLst/>
+          </a:prstGeom>
+          <a:noFill/>
+        </p:spPr>
+        <p:txBody>
+          <a:bodyPr wrap="square" rtlCol="0">
+            <a:spAutoFit/>
+          </a:bodyPr>
+          <a:lstStyle/>
+          <a:p>
+            <a:r>
+              <a:rPr lang="en-US" altLang="zh-CN" dirty="0"/>
+              <a:t>From:</a:t>
+            </a:r>
+          </a:p>
+          <a:p>
+            <a:r>
+              <a:rPr lang="en-US" altLang="zh-CN" dirty="0"/>
+              <a:t>https://gitee.com/harmonyos/OpenArkCompiler/issues/I182NY</a:t>
+            </a:r>
+            <a:endParaRPr lang="zh-CN" altLang="en-US" dirty="0"/>
+          </a:p>
+        </p:txBody>
+      </p:sp>
     </p:spTree>
     <p:extLst>
       <p:ext uri="{BB962C8B-B14F-4D97-AF65-F5344CB8AC3E}">

</xml_diff>